<commit_message>
UP _ exo GAB correction
</commit_message>
<xml_diff>
--- a/FOAD_Unified_Process/GAB/maquettage_GAB_retirer de l'argent dont s'identifier.pptx
+++ b/FOAD_Unified_Process/GAB/maquettage_GAB_retirer de l'argent dont s'identifier.pptx
@@ -212,7 +212,7 @@
           <a:p>
             <a:fld id="{F96AEA39-73FA-47F0-852A-B7EF8546D397}" type="datetimeFigureOut">
               <a:rPr lang="fr-FR" smtClean="0"/>
-              <a:t>23/02/2021</a:t>
+              <a:t>24/02/2021</a:t>
             </a:fld>
             <a:endParaRPr lang="fr-FR"/>
           </a:p>
@@ -1214,7 +1214,7 @@
           <a:p>
             <a:fld id="{B0CDD8A6-34CA-4E2D-8EA8-2CC00E15D543}" type="datetimeFigureOut">
               <a:rPr lang="fr-FR" smtClean="0"/>
-              <a:t>23/02/2021</a:t>
+              <a:t>24/02/2021</a:t>
             </a:fld>
             <a:endParaRPr lang="fr-FR"/>
           </a:p>
@@ -1412,7 +1412,7 @@
           <a:p>
             <a:fld id="{B0CDD8A6-34CA-4E2D-8EA8-2CC00E15D543}" type="datetimeFigureOut">
               <a:rPr lang="fr-FR" smtClean="0"/>
-              <a:t>23/02/2021</a:t>
+              <a:t>24/02/2021</a:t>
             </a:fld>
             <a:endParaRPr lang="fr-FR"/>
           </a:p>
@@ -1620,7 +1620,7 @@
           <a:p>
             <a:fld id="{B0CDD8A6-34CA-4E2D-8EA8-2CC00E15D543}" type="datetimeFigureOut">
               <a:rPr lang="fr-FR" smtClean="0"/>
-              <a:t>23/02/2021</a:t>
+              <a:t>24/02/2021</a:t>
             </a:fld>
             <a:endParaRPr lang="fr-FR"/>
           </a:p>
@@ -1818,7 +1818,7 @@
           <a:p>
             <a:fld id="{B0CDD8A6-34CA-4E2D-8EA8-2CC00E15D543}" type="datetimeFigureOut">
               <a:rPr lang="fr-FR" smtClean="0"/>
-              <a:t>23/02/2021</a:t>
+              <a:t>24/02/2021</a:t>
             </a:fld>
             <a:endParaRPr lang="fr-FR"/>
           </a:p>
@@ -2093,7 +2093,7 @@
           <a:p>
             <a:fld id="{B0CDD8A6-34CA-4E2D-8EA8-2CC00E15D543}" type="datetimeFigureOut">
               <a:rPr lang="fr-FR" smtClean="0"/>
-              <a:t>23/02/2021</a:t>
+              <a:t>24/02/2021</a:t>
             </a:fld>
             <a:endParaRPr lang="fr-FR"/>
           </a:p>
@@ -2358,7 +2358,7 @@
           <a:p>
             <a:fld id="{B0CDD8A6-34CA-4E2D-8EA8-2CC00E15D543}" type="datetimeFigureOut">
               <a:rPr lang="fr-FR" smtClean="0"/>
-              <a:t>23/02/2021</a:t>
+              <a:t>24/02/2021</a:t>
             </a:fld>
             <a:endParaRPr lang="fr-FR"/>
           </a:p>
@@ -2770,7 +2770,7 @@
           <a:p>
             <a:fld id="{B0CDD8A6-34CA-4E2D-8EA8-2CC00E15D543}" type="datetimeFigureOut">
               <a:rPr lang="fr-FR" smtClean="0"/>
-              <a:t>23/02/2021</a:t>
+              <a:t>24/02/2021</a:t>
             </a:fld>
             <a:endParaRPr lang="fr-FR"/>
           </a:p>
@@ -2911,7 +2911,7 @@
           <a:p>
             <a:fld id="{B0CDD8A6-34CA-4E2D-8EA8-2CC00E15D543}" type="datetimeFigureOut">
               <a:rPr lang="fr-FR" smtClean="0"/>
-              <a:t>23/02/2021</a:t>
+              <a:t>24/02/2021</a:t>
             </a:fld>
             <a:endParaRPr lang="fr-FR"/>
           </a:p>
@@ -3024,7 +3024,7 @@
           <a:p>
             <a:fld id="{B0CDD8A6-34CA-4E2D-8EA8-2CC00E15D543}" type="datetimeFigureOut">
               <a:rPr lang="fr-FR" smtClean="0"/>
-              <a:t>23/02/2021</a:t>
+              <a:t>24/02/2021</a:t>
             </a:fld>
             <a:endParaRPr lang="fr-FR"/>
           </a:p>
@@ -3335,7 +3335,7 @@
           <a:p>
             <a:fld id="{B0CDD8A6-34CA-4E2D-8EA8-2CC00E15D543}" type="datetimeFigureOut">
               <a:rPr lang="fr-FR" smtClean="0"/>
-              <a:t>23/02/2021</a:t>
+              <a:t>24/02/2021</a:t>
             </a:fld>
             <a:endParaRPr lang="fr-FR"/>
           </a:p>
@@ -3623,7 +3623,7 @@
           <a:p>
             <a:fld id="{B0CDD8A6-34CA-4E2D-8EA8-2CC00E15D543}" type="datetimeFigureOut">
               <a:rPr lang="fr-FR" smtClean="0"/>
-              <a:t>23/02/2021</a:t>
+              <a:t>24/02/2021</a:t>
             </a:fld>
             <a:endParaRPr lang="fr-FR"/>
           </a:p>
@@ -3864,7 +3864,7 @@
           <a:p>
             <a:fld id="{B0CDD8A6-34CA-4E2D-8EA8-2CC00E15D543}" type="datetimeFigureOut">
               <a:rPr lang="fr-FR" smtClean="0"/>
-              <a:t>23/02/2021</a:t>
+              <a:t>24/02/2021</a:t>
             </a:fld>
             <a:endParaRPr lang="fr-FR"/>
           </a:p>
@@ -4712,7 +4712,7 @@
         <p:spPr>
           <a:xfrm>
             <a:off x="705853" y="63987"/>
-            <a:ext cx="4213013" cy="369332"/>
+            <a:ext cx="6723315" cy="369332"/>
           </a:xfrm>
           <a:prstGeom prst="rect">
             <a:avLst/>
@@ -4730,7 +4730,7 @@
                 <a:latin typeface="Roboto Light" panose="02000000000000000000" pitchFamily="2" charset="0"/>
                 <a:ea typeface="Roboto Light" panose="02000000000000000000" pitchFamily="2" charset="0"/>
               </a:rPr>
-              <a:t>Ecran : Liquidités du GAB insuffisantes</a:t>
+              <a:t>Ecran : Liquidités du GAB insuffisantes pour le montant demandé</a:t>
             </a:r>
           </a:p>
         </p:txBody>
@@ -11318,64 +11318,7 @@
         </p:nvSpPr>
         <p:spPr>
           <a:xfrm>
-            <a:off x="978569" y="4159127"/>
-            <a:ext cx="5029200" cy="914400"/>
-          </a:xfrm>
-          <a:prstGeom prst="rect">
-            <a:avLst/>
-          </a:prstGeom>
-          <a:solidFill>
-            <a:srgbClr val="43B6C5">
-              <a:alpha val="63137"/>
-            </a:srgbClr>
-          </a:solidFill>
-          <a:ln>
-            <a:noFill/>
-          </a:ln>
-        </p:spPr>
-        <p:style>
-          <a:lnRef idx="2">
-            <a:schemeClr val="accent1">
-              <a:shade val="50000"/>
-            </a:schemeClr>
-          </a:lnRef>
-          <a:fillRef idx="1">
-            <a:schemeClr val="accent1"/>
-          </a:fillRef>
-          <a:effectRef idx="0">
-            <a:schemeClr val="accent1"/>
-          </a:effectRef>
-          <a:fontRef idx="minor">
-            <a:schemeClr val="lt1"/>
-          </a:fontRef>
-        </p:style>
-        <p:txBody>
-          <a:bodyPr rtlCol="0" anchor="ctr"/>
-          <a:lstStyle/>
-          <a:p>
-            <a:pPr algn="ctr"/>
-            <a:endParaRPr lang="fr-FR">
-              <a:latin typeface="Roboto Light" panose="02000000000000000000" pitchFamily="2" charset="0"/>
-              <a:ea typeface="Roboto Light" panose="02000000000000000000" pitchFamily="2" charset="0"/>
-            </a:endParaRPr>
-          </a:p>
-        </p:txBody>
-      </p:sp>
-      <p:sp>
-        <p:nvSpPr>
-          <p:cNvPr id="18" name="Rectangle 17">
-            <a:extLst>
-              <a:ext uri="{FF2B5EF4-FFF2-40B4-BE49-F238E27FC236}">
-                <a16:creationId xmlns:a16="http://schemas.microsoft.com/office/drawing/2014/main" id="{1CC68D05-365C-43B6-AD2F-C1419D61928E}"/>
-              </a:ext>
-            </a:extLst>
-          </p:cNvPr>
-          <p:cNvSpPr/>
-          <p:nvPr/>
-        </p:nvSpPr>
-        <p:spPr>
-          <a:xfrm>
-            <a:off x="6200273" y="4159126"/>
+            <a:off x="978569" y="4633260"/>
             <a:ext cx="5029200" cy="914400"/>
           </a:xfrm>
           <a:prstGeom prst="rect">
@@ -11564,7 +11507,7 @@
         </p:nvSpPr>
         <p:spPr>
           <a:xfrm>
-            <a:off x="978569" y="1952990"/>
+            <a:off x="978569" y="2427123"/>
             <a:ext cx="5029200" cy="914400"/>
           </a:xfrm>
           <a:prstGeom prst="rect">
@@ -11621,7 +11564,7 @@
         </p:nvSpPr>
         <p:spPr>
           <a:xfrm>
-            <a:off x="978569" y="3056059"/>
+            <a:off x="978569" y="3530192"/>
             <a:ext cx="5029200" cy="914400"/>
           </a:xfrm>
           <a:prstGeom prst="rect">
@@ -11678,7 +11621,7 @@
         </p:nvSpPr>
         <p:spPr>
           <a:xfrm>
-            <a:off x="6200275" y="1952990"/>
+            <a:off x="6200275" y="2427123"/>
             <a:ext cx="5029200" cy="914400"/>
           </a:xfrm>
           <a:prstGeom prst="rect">
@@ -11735,7 +11678,7 @@
         </p:nvSpPr>
         <p:spPr>
           <a:xfrm>
-            <a:off x="6200273" y="3056058"/>
+            <a:off x="6200273" y="3530191"/>
             <a:ext cx="5029200" cy="914400"/>
           </a:xfrm>
           <a:prstGeom prst="rect">
@@ -11792,7 +11735,7 @@
         </p:nvSpPr>
         <p:spPr>
           <a:xfrm>
-            <a:off x="1172621" y="2070612"/>
+            <a:off x="1172621" y="2544745"/>
             <a:ext cx="1521570" cy="646331"/>
           </a:xfrm>
           <a:prstGeom prst="rect">
@@ -11830,7 +11773,7 @@
         </p:nvSpPr>
         <p:spPr>
           <a:xfrm>
-            <a:off x="1172621" y="3190093"/>
+            <a:off x="1172621" y="3664226"/>
             <a:ext cx="1390124" cy="646331"/>
           </a:xfrm>
           <a:prstGeom prst="rect">
@@ -11868,7 +11811,7 @@
         </p:nvSpPr>
         <p:spPr>
           <a:xfrm>
-            <a:off x="9110663" y="2087024"/>
+            <a:off x="9110663" y="2561157"/>
             <a:ext cx="2018501" cy="646331"/>
           </a:xfrm>
           <a:prstGeom prst="rect">
@@ -11906,7 +11849,7 @@
         </p:nvSpPr>
         <p:spPr>
           <a:xfrm>
-            <a:off x="8281910" y="3190092"/>
+            <a:off x="8281910" y="3664225"/>
             <a:ext cx="2847254" cy="646331"/>
           </a:xfrm>
           <a:prstGeom prst="rect">
@@ -11944,7 +11887,7 @@
         </p:nvSpPr>
         <p:spPr>
           <a:xfrm>
-            <a:off x="1172621" y="4293160"/>
+            <a:off x="1172621" y="4767293"/>
             <a:ext cx="4714752" cy="646331"/>
           </a:xfrm>
           <a:prstGeom prst="rect">
@@ -11970,10 +11913,67 @@
       </p:sp>
       <p:sp>
         <p:nvSpPr>
-          <p:cNvPr id="19" name="ZoneTexte 18">
-            <a:extLst>
-              <a:ext uri="{FF2B5EF4-FFF2-40B4-BE49-F238E27FC236}">
-                <a16:creationId xmlns:a16="http://schemas.microsoft.com/office/drawing/2014/main" id="{2873E973-7939-4DCC-B6F6-CF93397553D9}"/>
+          <p:cNvPr id="20" name="Rectangle 19">
+            <a:extLst>
+              <a:ext uri="{FF2B5EF4-FFF2-40B4-BE49-F238E27FC236}">
+                <a16:creationId xmlns:a16="http://schemas.microsoft.com/office/drawing/2014/main" id="{25E0F586-260C-4E16-8BE4-41A3BAF6942F}"/>
+              </a:ext>
+            </a:extLst>
+          </p:cNvPr>
+          <p:cNvSpPr/>
+          <p:nvPr/>
+        </p:nvSpPr>
+        <p:spPr>
+          <a:xfrm>
+            <a:off x="6200273" y="4647017"/>
+            <a:ext cx="5029200" cy="914400"/>
+          </a:xfrm>
+          <a:prstGeom prst="rect">
+            <a:avLst/>
+          </a:prstGeom>
+          <a:solidFill>
+            <a:srgbClr val="153E43">
+              <a:alpha val="62353"/>
+            </a:srgbClr>
+          </a:solidFill>
+          <a:ln>
+            <a:noFill/>
+          </a:ln>
+        </p:spPr>
+        <p:style>
+          <a:lnRef idx="2">
+            <a:schemeClr val="accent1">
+              <a:shade val="50000"/>
+            </a:schemeClr>
+          </a:lnRef>
+          <a:fillRef idx="1">
+            <a:schemeClr val="accent1"/>
+          </a:fillRef>
+          <a:effectRef idx="0">
+            <a:schemeClr val="accent1"/>
+          </a:effectRef>
+          <a:fontRef idx="minor">
+            <a:schemeClr val="lt1"/>
+          </a:fontRef>
+        </p:style>
+        <p:txBody>
+          <a:bodyPr rtlCol="0" anchor="ctr"/>
+          <a:lstStyle/>
+          <a:p>
+            <a:pPr algn="ctr"/>
+            <a:endParaRPr lang="fr-FR" dirty="0">
+              <a:latin typeface="Roboto Light" panose="02000000000000000000" pitchFamily="2" charset="0"/>
+              <a:ea typeface="Roboto Light" panose="02000000000000000000" pitchFamily="2" charset="0"/>
+            </a:endParaRPr>
+          </a:p>
+        </p:txBody>
+      </p:sp>
+      <p:sp>
+        <p:nvSpPr>
+          <p:cNvPr id="23" name="ZoneTexte 22">
+            <a:extLst>
+              <a:ext uri="{FF2B5EF4-FFF2-40B4-BE49-F238E27FC236}">
+                <a16:creationId xmlns:a16="http://schemas.microsoft.com/office/drawing/2014/main" id="{0F113D50-507A-48F0-B639-910ECB5DFFA3}"/>
               </a:ext>
             </a:extLst>
           </p:cNvPr>
@@ -11982,8 +11982,8 @@
         </p:nvSpPr>
         <p:spPr>
           <a:xfrm>
-            <a:off x="7988561" y="4293160"/>
-            <a:ext cx="3140603" cy="646331"/>
+            <a:off x="7525292" y="4778324"/>
+            <a:ext cx="3603872" cy="646331"/>
           </a:xfrm>
           <a:prstGeom prst="rect">
             <a:avLst/>
@@ -11998,20 +11998,922 @@
           <a:p>
             <a:r>
               <a:rPr lang="fr-FR" sz="3600" dirty="0">
+                <a:solidFill>
+                  <a:schemeClr val="bg1"/>
+                </a:solidFill>
                 <a:latin typeface="Roboto Light" panose="02000000000000000000" pitchFamily="2" charset="0"/>
                 <a:ea typeface="Roboto Light" panose="02000000000000000000" pitchFamily="2" charset="0"/>
               </a:rPr>
-              <a:t>Restituer carte</a:t>
+              <a:t>Restituer la carte</a:t>
             </a:r>
           </a:p>
         </p:txBody>
       </p:sp>
-      <p:sp>
-        <p:nvSpPr>
-          <p:cNvPr id="20" name="Rectangle 19">
-            <a:extLst>
-              <a:ext uri="{FF2B5EF4-FFF2-40B4-BE49-F238E27FC236}">
-                <a16:creationId xmlns:a16="http://schemas.microsoft.com/office/drawing/2014/main" id="{25E0F586-260C-4E16-8BE4-41A3BAF6942F}"/>
+    </p:spTree>
+    <p:extLst>
+      <p:ext uri="{BB962C8B-B14F-4D97-AF65-F5344CB8AC3E}">
+        <p14:creationId xmlns:p14="http://schemas.microsoft.com/office/powerpoint/2010/main" val="913850948"/>
+      </p:ext>
+    </p:extLst>
+  </p:cSld>
+  <p:clrMapOvr>
+    <a:masterClrMapping/>
+  </p:clrMapOvr>
+</p:sld>
+</file>
+
+<file path=ppt/slides/slide8.xml><?xml version="1.0" encoding="utf-8"?>
+<p:sld xmlns:a="http://schemas.openxmlformats.org/drawingml/2006/main" xmlns:r="http://schemas.openxmlformats.org/officeDocument/2006/relationships" xmlns:p="http://schemas.openxmlformats.org/presentationml/2006/main">
+  <p:cSld>
+    <p:spTree>
+      <p:nvGrpSpPr>
+        <p:cNvPr id="1" name=""/>
+        <p:cNvGrpSpPr/>
+        <p:nvPr/>
+      </p:nvGrpSpPr>
+      <p:grpSpPr>
+        <a:xfrm>
+          <a:off x="0" y="0"/>
+          <a:ext cx="0" cy="0"/>
+          <a:chOff x="0" y="0"/>
+          <a:chExt cx="0" cy="0"/>
+        </a:xfrm>
+      </p:grpSpPr>
+      <p:sp>
+        <p:nvSpPr>
+          <p:cNvPr id="24" name="Rectangle 23">
+            <a:extLst>
+              <a:ext uri="{FF2B5EF4-FFF2-40B4-BE49-F238E27FC236}">
+                <a16:creationId xmlns:a16="http://schemas.microsoft.com/office/drawing/2014/main" id="{5B7C57DF-994F-4DE6-9A12-3BE139AED216}"/>
+              </a:ext>
+            </a:extLst>
+          </p:cNvPr>
+          <p:cNvSpPr/>
+          <p:nvPr/>
+        </p:nvSpPr>
+        <p:spPr>
+          <a:xfrm>
+            <a:off x="6191690" y="1928621"/>
+            <a:ext cx="5029200" cy="646331"/>
+          </a:xfrm>
+          <a:prstGeom prst="rect">
+            <a:avLst/>
+          </a:prstGeom>
+          <a:solidFill>
+            <a:srgbClr val="43B6C5">
+              <a:alpha val="63137"/>
+            </a:srgbClr>
+          </a:solidFill>
+          <a:ln>
+            <a:noFill/>
+          </a:ln>
+        </p:spPr>
+        <p:style>
+          <a:lnRef idx="2">
+            <a:schemeClr val="accent1">
+              <a:shade val="50000"/>
+            </a:schemeClr>
+          </a:lnRef>
+          <a:fillRef idx="1">
+            <a:schemeClr val="accent1"/>
+          </a:fillRef>
+          <a:effectRef idx="0">
+            <a:schemeClr val="accent1"/>
+          </a:effectRef>
+          <a:fontRef idx="minor">
+            <a:schemeClr val="lt1"/>
+          </a:fontRef>
+        </p:style>
+        <p:txBody>
+          <a:bodyPr rtlCol="0" anchor="ctr"/>
+          <a:lstStyle/>
+          <a:p>
+            <a:pPr algn="ctr"/>
+            <a:endParaRPr lang="fr-FR" dirty="0">
+              <a:latin typeface="+mj-lt"/>
+            </a:endParaRPr>
+          </a:p>
+        </p:txBody>
+      </p:sp>
+      <p:sp>
+        <p:nvSpPr>
+          <p:cNvPr id="25" name="Rectangle 24">
+            <a:extLst>
+              <a:ext uri="{FF2B5EF4-FFF2-40B4-BE49-F238E27FC236}">
+                <a16:creationId xmlns:a16="http://schemas.microsoft.com/office/drawing/2014/main" id="{DE001D6B-24E7-4F70-90C7-1B932407304A}"/>
+              </a:ext>
+            </a:extLst>
+          </p:cNvPr>
+          <p:cNvSpPr/>
+          <p:nvPr/>
+        </p:nvSpPr>
+        <p:spPr>
+          <a:xfrm>
+            <a:off x="6191690" y="2718828"/>
+            <a:ext cx="5029200" cy="646331"/>
+          </a:xfrm>
+          <a:prstGeom prst="rect">
+            <a:avLst/>
+          </a:prstGeom>
+          <a:solidFill>
+            <a:srgbClr val="43B6C5">
+              <a:alpha val="63137"/>
+            </a:srgbClr>
+          </a:solidFill>
+          <a:ln>
+            <a:noFill/>
+          </a:ln>
+        </p:spPr>
+        <p:style>
+          <a:lnRef idx="2">
+            <a:schemeClr val="accent1">
+              <a:shade val="50000"/>
+            </a:schemeClr>
+          </a:lnRef>
+          <a:fillRef idx="1">
+            <a:schemeClr val="accent1"/>
+          </a:fillRef>
+          <a:effectRef idx="0">
+            <a:schemeClr val="accent1"/>
+          </a:effectRef>
+          <a:fontRef idx="minor">
+            <a:schemeClr val="lt1"/>
+          </a:fontRef>
+        </p:style>
+        <p:txBody>
+          <a:bodyPr rtlCol="0" anchor="ctr"/>
+          <a:lstStyle/>
+          <a:p>
+            <a:pPr algn="ctr"/>
+            <a:endParaRPr lang="fr-FR">
+              <a:latin typeface="+mj-lt"/>
+            </a:endParaRPr>
+          </a:p>
+        </p:txBody>
+      </p:sp>
+      <p:sp>
+        <p:nvSpPr>
+          <p:cNvPr id="26" name="Rectangle 25">
+            <a:extLst>
+              <a:ext uri="{FF2B5EF4-FFF2-40B4-BE49-F238E27FC236}">
+                <a16:creationId xmlns:a16="http://schemas.microsoft.com/office/drawing/2014/main" id="{AD7E78B4-EB3E-4A69-B2CF-6F4C95B73B29}"/>
+              </a:ext>
+            </a:extLst>
+          </p:cNvPr>
+          <p:cNvSpPr/>
+          <p:nvPr/>
+        </p:nvSpPr>
+        <p:spPr>
+          <a:xfrm>
+            <a:off x="6191690" y="3509035"/>
+            <a:ext cx="5029200" cy="646331"/>
+          </a:xfrm>
+          <a:prstGeom prst="rect">
+            <a:avLst/>
+          </a:prstGeom>
+          <a:solidFill>
+            <a:srgbClr val="43B6C5">
+              <a:alpha val="63137"/>
+            </a:srgbClr>
+          </a:solidFill>
+          <a:ln>
+            <a:noFill/>
+          </a:ln>
+        </p:spPr>
+        <p:style>
+          <a:lnRef idx="2">
+            <a:schemeClr val="accent1">
+              <a:shade val="50000"/>
+            </a:schemeClr>
+          </a:lnRef>
+          <a:fillRef idx="1">
+            <a:schemeClr val="accent1"/>
+          </a:fillRef>
+          <a:effectRef idx="0">
+            <a:schemeClr val="accent1"/>
+          </a:effectRef>
+          <a:fontRef idx="minor">
+            <a:schemeClr val="lt1"/>
+          </a:fontRef>
+        </p:style>
+        <p:txBody>
+          <a:bodyPr rtlCol="0" anchor="ctr"/>
+          <a:lstStyle/>
+          <a:p>
+            <a:pPr algn="ctr"/>
+            <a:endParaRPr lang="fr-FR">
+              <a:latin typeface="+mj-lt"/>
+            </a:endParaRPr>
+          </a:p>
+        </p:txBody>
+      </p:sp>
+      <p:sp>
+        <p:nvSpPr>
+          <p:cNvPr id="27" name="Rectangle 26">
+            <a:extLst>
+              <a:ext uri="{FF2B5EF4-FFF2-40B4-BE49-F238E27FC236}">
+                <a16:creationId xmlns:a16="http://schemas.microsoft.com/office/drawing/2014/main" id="{72F83B2A-7E96-4ECC-96E5-A11584DCE89A}"/>
+              </a:ext>
+            </a:extLst>
+          </p:cNvPr>
+          <p:cNvSpPr/>
+          <p:nvPr/>
+        </p:nvSpPr>
+        <p:spPr>
+          <a:xfrm>
+            <a:off x="6191690" y="4299242"/>
+            <a:ext cx="5029200" cy="646331"/>
+          </a:xfrm>
+          <a:prstGeom prst="rect">
+            <a:avLst/>
+          </a:prstGeom>
+          <a:solidFill>
+            <a:srgbClr val="43B6C5">
+              <a:alpha val="63137"/>
+            </a:srgbClr>
+          </a:solidFill>
+          <a:ln>
+            <a:noFill/>
+          </a:ln>
+        </p:spPr>
+        <p:style>
+          <a:lnRef idx="2">
+            <a:schemeClr val="accent1">
+              <a:shade val="50000"/>
+            </a:schemeClr>
+          </a:lnRef>
+          <a:fillRef idx="1">
+            <a:schemeClr val="accent1"/>
+          </a:fillRef>
+          <a:effectRef idx="0">
+            <a:schemeClr val="accent1"/>
+          </a:effectRef>
+          <a:fontRef idx="minor">
+            <a:schemeClr val="lt1"/>
+          </a:fontRef>
+        </p:style>
+        <p:txBody>
+          <a:bodyPr rtlCol="0" anchor="ctr"/>
+          <a:lstStyle/>
+          <a:p>
+            <a:pPr algn="ctr"/>
+            <a:endParaRPr lang="fr-FR">
+              <a:latin typeface="+mj-lt"/>
+            </a:endParaRPr>
+          </a:p>
+        </p:txBody>
+      </p:sp>
+      <p:sp>
+        <p:nvSpPr>
+          <p:cNvPr id="3" name="Rectangle 2">
+            <a:extLst>
+              <a:ext uri="{FF2B5EF4-FFF2-40B4-BE49-F238E27FC236}">
+                <a16:creationId xmlns:a16="http://schemas.microsoft.com/office/drawing/2014/main" id="{2E8E3367-571F-486C-80AB-043BF71E1C3E}"/>
+              </a:ext>
+            </a:extLst>
+          </p:cNvPr>
+          <p:cNvSpPr/>
+          <p:nvPr/>
+        </p:nvSpPr>
+        <p:spPr>
+          <a:xfrm>
+            <a:off x="705853" y="465221"/>
+            <a:ext cx="10780295" cy="5927558"/>
+          </a:xfrm>
+          <a:prstGeom prst="rect">
+            <a:avLst/>
+          </a:prstGeom>
+          <a:noFill/>
+          <a:ln w="57150">
+            <a:solidFill>
+              <a:srgbClr val="FFC000"/>
+            </a:solidFill>
+          </a:ln>
+        </p:spPr>
+        <p:style>
+          <a:lnRef idx="2">
+            <a:schemeClr val="accent1">
+              <a:shade val="50000"/>
+            </a:schemeClr>
+          </a:lnRef>
+          <a:fillRef idx="1">
+            <a:schemeClr val="accent1"/>
+          </a:fillRef>
+          <a:effectRef idx="0">
+            <a:schemeClr val="accent1"/>
+          </a:effectRef>
+          <a:fontRef idx="minor">
+            <a:schemeClr val="lt1"/>
+          </a:fontRef>
+        </p:style>
+        <p:txBody>
+          <a:bodyPr rtlCol="0" anchor="ctr"/>
+          <a:lstStyle/>
+          <a:p>
+            <a:pPr algn="ctr"/>
+            <a:endParaRPr lang="fr-FR">
+              <a:latin typeface="+mj-lt"/>
+            </a:endParaRPr>
+          </a:p>
+        </p:txBody>
+      </p:sp>
+      <p:sp>
+        <p:nvSpPr>
+          <p:cNvPr id="2" name="Titre 1">
+            <a:extLst>
+              <a:ext uri="{FF2B5EF4-FFF2-40B4-BE49-F238E27FC236}">
+                <a16:creationId xmlns:a16="http://schemas.microsoft.com/office/drawing/2014/main" id="{D738593F-B18F-4600-AF47-F18EDBE0844C}"/>
+              </a:ext>
+            </a:extLst>
+          </p:cNvPr>
+          <p:cNvSpPr>
+            <a:spLocks noGrp="1"/>
+          </p:cNvSpPr>
+          <p:nvPr>
+            <p:ph type="title"/>
+          </p:nvPr>
+        </p:nvSpPr>
+        <p:spPr>
+          <a:xfrm>
+            <a:off x="838200" y="520079"/>
+            <a:ext cx="10515600" cy="1325563"/>
+          </a:xfrm>
+        </p:spPr>
+        <p:txBody>
+          <a:bodyPr/>
+          <a:lstStyle/>
+          <a:p>
+            <a:pPr algn="ctr"/>
+            <a:r>
+              <a:rPr lang="fr-FR" dirty="0"/>
+              <a:t>Sélectionner le montant</a:t>
+            </a:r>
+          </a:p>
+        </p:txBody>
+      </p:sp>
+      <p:sp>
+        <p:nvSpPr>
+          <p:cNvPr id="4" name="ZoneTexte 3">
+            <a:extLst>
+              <a:ext uri="{FF2B5EF4-FFF2-40B4-BE49-F238E27FC236}">
+                <a16:creationId xmlns:a16="http://schemas.microsoft.com/office/drawing/2014/main" id="{5B2C0825-ABD4-4F7B-8EA3-9F95BAA7C9AC}"/>
+              </a:ext>
+            </a:extLst>
+          </p:cNvPr>
+          <p:cNvSpPr txBox="1"/>
+          <p:nvPr/>
+        </p:nvSpPr>
+        <p:spPr>
+          <a:xfrm>
+            <a:off x="705853" y="63987"/>
+            <a:ext cx="2588657" cy="369332"/>
+          </a:xfrm>
+          <a:prstGeom prst="rect">
+            <a:avLst/>
+          </a:prstGeom>
+          <a:noFill/>
+        </p:spPr>
+        <p:txBody>
+          <a:bodyPr wrap="none" rtlCol="0">
+            <a:spAutoFit/>
+          </a:bodyPr>
+          <a:lstStyle/>
+          <a:p>
+            <a:r>
+              <a:rPr lang="fr-FR" dirty="0">
+                <a:latin typeface="+mj-lt"/>
+              </a:rPr>
+              <a:t>Ecran : Sélection montant</a:t>
+            </a:r>
+          </a:p>
+        </p:txBody>
+      </p:sp>
+      <p:sp>
+        <p:nvSpPr>
+          <p:cNvPr id="5" name="Rectangle 4">
+            <a:extLst>
+              <a:ext uri="{FF2B5EF4-FFF2-40B4-BE49-F238E27FC236}">
+                <a16:creationId xmlns:a16="http://schemas.microsoft.com/office/drawing/2014/main" id="{3A2D216E-7958-48BE-8D9B-61354C883A06}"/>
+              </a:ext>
+            </a:extLst>
+          </p:cNvPr>
+          <p:cNvSpPr/>
+          <p:nvPr/>
+        </p:nvSpPr>
+        <p:spPr>
+          <a:xfrm>
+            <a:off x="975561" y="1928621"/>
+            <a:ext cx="5029200" cy="646331"/>
+          </a:xfrm>
+          <a:prstGeom prst="rect">
+            <a:avLst/>
+          </a:prstGeom>
+          <a:solidFill>
+            <a:srgbClr val="43B6C5">
+              <a:alpha val="63137"/>
+            </a:srgbClr>
+          </a:solidFill>
+          <a:ln>
+            <a:noFill/>
+          </a:ln>
+        </p:spPr>
+        <p:style>
+          <a:lnRef idx="2">
+            <a:schemeClr val="accent1">
+              <a:shade val="50000"/>
+            </a:schemeClr>
+          </a:lnRef>
+          <a:fillRef idx="1">
+            <a:schemeClr val="accent1"/>
+          </a:fillRef>
+          <a:effectRef idx="0">
+            <a:schemeClr val="accent1"/>
+          </a:effectRef>
+          <a:fontRef idx="minor">
+            <a:schemeClr val="lt1"/>
+          </a:fontRef>
+        </p:style>
+        <p:txBody>
+          <a:bodyPr rtlCol="0" anchor="ctr"/>
+          <a:lstStyle/>
+          <a:p>
+            <a:pPr algn="ctr"/>
+            <a:endParaRPr lang="fr-FR" dirty="0">
+              <a:latin typeface="+mj-lt"/>
+            </a:endParaRPr>
+          </a:p>
+        </p:txBody>
+      </p:sp>
+      <p:sp>
+        <p:nvSpPr>
+          <p:cNvPr id="7" name="Rectangle 6">
+            <a:extLst>
+              <a:ext uri="{FF2B5EF4-FFF2-40B4-BE49-F238E27FC236}">
+                <a16:creationId xmlns:a16="http://schemas.microsoft.com/office/drawing/2014/main" id="{6D1494D5-3EBC-4916-8D8B-26C38EAC8079}"/>
+              </a:ext>
+            </a:extLst>
+          </p:cNvPr>
+          <p:cNvSpPr/>
+          <p:nvPr/>
+        </p:nvSpPr>
+        <p:spPr>
+          <a:xfrm>
+            <a:off x="975561" y="2718828"/>
+            <a:ext cx="5029200" cy="646331"/>
+          </a:xfrm>
+          <a:prstGeom prst="rect">
+            <a:avLst/>
+          </a:prstGeom>
+          <a:solidFill>
+            <a:srgbClr val="43B6C5">
+              <a:alpha val="63137"/>
+            </a:srgbClr>
+          </a:solidFill>
+          <a:ln>
+            <a:noFill/>
+          </a:ln>
+        </p:spPr>
+        <p:style>
+          <a:lnRef idx="2">
+            <a:schemeClr val="accent1">
+              <a:shade val="50000"/>
+            </a:schemeClr>
+          </a:lnRef>
+          <a:fillRef idx="1">
+            <a:schemeClr val="accent1"/>
+          </a:fillRef>
+          <a:effectRef idx="0">
+            <a:schemeClr val="accent1"/>
+          </a:effectRef>
+          <a:fontRef idx="minor">
+            <a:schemeClr val="lt1"/>
+          </a:fontRef>
+        </p:style>
+        <p:txBody>
+          <a:bodyPr rtlCol="0" anchor="ctr"/>
+          <a:lstStyle/>
+          <a:p>
+            <a:pPr algn="ctr"/>
+            <a:endParaRPr lang="fr-FR">
+              <a:latin typeface="+mj-lt"/>
+            </a:endParaRPr>
+          </a:p>
+        </p:txBody>
+      </p:sp>
+      <p:sp>
+        <p:nvSpPr>
+          <p:cNvPr id="9" name="Rectangle 8">
+            <a:extLst>
+              <a:ext uri="{FF2B5EF4-FFF2-40B4-BE49-F238E27FC236}">
+                <a16:creationId xmlns:a16="http://schemas.microsoft.com/office/drawing/2014/main" id="{09C4F6D1-11FF-4A97-BDF1-53DFC43534D2}"/>
+              </a:ext>
+            </a:extLst>
+          </p:cNvPr>
+          <p:cNvSpPr/>
+          <p:nvPr/>
+        </p:nvSpPr>
+        <p:spPr>
+          <a:xfrm>
+            <a:off x="975561" y="3509035"/>
+            <a:ext cx="5029200" cy="646331"/>
+          </a:xfrm>
+          <a:prstGeom prst="rect">
+            <a:avLst/>
+          </a:prstGeom>
+          <a:solidFill>
+            <a:srgbClr val="43B6C5">
+              <a:alpha val="63137"/>
+            </a:srgbClr>
+          </a:solidFill>
+          <a:ln>
+            <a:noFill/>
+          </a:ln>
+        </p:spPr>
+        <p:style>
+          <a:lnRef idx="2">
+            <a:schemeClr val="accent1">
+              <a:shade val="50000"/>
+            </a:schemeClr>
+          </a:lnRef>
+          <a:fillRef idx="1">
+            <a:schemeClr val="accent1"/>
+          </a:fillRef>
+          <a:effectRef idx="0">
+            <a:schemeClr val="accent1"/>
+          </a:effectRef>
+          <a:fontRef idx="minor">
+            <a:schemeClr val="lt1"/>
+          </a:fontRef>
+        </p:style>
+        <p:txBody>
+          <a:bodyPr rtlCol="0" anchor="ctr"/>
+          <a:lstStyle/>
+          <a:p>
+            <a:pPr algn="ctr"/>
+            <a:endParaRPr lang="fr-FR">
+              <a:latin typeface="+mj-lt"/>
+            </a:endParaRPr>
+          </a:p>
+        </p:txBody>
+      </p:sp>
+      <p:sp>
+        <p:nvSpPr>
+          <p:cNvPr id="11" name="Rectangle 10">
+            <a:extLst>
+              <a:ext uri="{FF2B5EF4-FFF2-40B4-BE49-F238E27FC236}">
+                <a16:creationId xmlns:a16="http://schemas.microsoft.com/office/drawing/2014/main" id="{080A5065-1FD5-4FFB-A04F-19FC967106AB}"/>
+              </a:ext>
+            </a:extLst>
+          </p:cNvPr>
+          <p:cNvSpPr/>
+          <p:nvPr/>
+        </p:nvSpPr>
+        <p:spPr>
+          <a:xfrm>
+            <a:off x="975561" y="4299242"/>
+            <a:ext cx="5029200" cy="646331"/>
+          </a:xfrm>
+          <a:prstGeom prst="rect">
+            <a:avLst/>
+          </a:prstGeom>
+          <a:solidFill>
+            <a:srgbClr val="43B6C5">
+              <a:alpha val="63137"/>
+            </a:srgbClr>
+          </a:solidFill>
+          <a:ln>
+            <a:noFill/>
+          </a:ln>
+        </p:spPr>
+        <p:style>
+          <a:lnRef idx="2">
+            <a:schemeClr val="accent1">
+              <a:shade val="50000"/>
+            </a:schemeClr>
+          </a:lnRef>
+          <a:fillRef idx="1">
+            <a:schemeClr val="accent1"/>
+          </a:fillRef>
+          <a:effectRef idx="0">
+            <a:schemeClr val="accent1"/>
+          </a:effectRef>
+          <a:fontRef idx="minor">
+            <a:schemeClr val="lt1"/>
+          </a:fontRef>
+        </p:style>
+        <p:txBody>
+          <a:bodyPr rtlCol="0" anchor="ctr"/>
+          <a:lstStyle/>
+          <a:p>
+            <a:pPr algn="ctr"/>
+            <a:endParaRPr lang="fr-FR">
+              <a:latin typeface="+mj-lt"/>
+            </a:endParaRPr>
+          </a:p>
+        </p:txBody>
+      </p:sp>
+      <p:sp>
+        <p:nvSpPr>
+          <p:cNvPr id="13" name="ZoneTexte 12">
+            <a:extLst>
+              <a:ext uri="{FF2B5EF4-FFF2-40B4-BE49-F238E27FC236}">
+                <a16:creationId xmlns:a16="http://schemas.microsoft.com/office/drawing/2014/main" id="{FB528374-D78D-471A-93B2-FF58DA6BF514}"/>
+              </a:ext>
+            </a:extLst>
+          </p:cNvPr>
+          <p:cNvSpPr txBox="1"/>
+          <p:nvPr/>
+        </p:nvSpPr>
+        <p:spPr>
+          <a:xfrm>
+            <a:off x="1149012" y="1916486"/>
+            <a:ext cx="990977" cy="646331"/>
+          </a:xfrm>
+          <a:prstGeom prst="rect">
+            <a:avLst/>
+          </a:prstGeom>
+          <a:noFill/>
+        </p:spPr>
+        <p:txBody>
+          <a:bodyPr wrap="none" rtlCol="0">
+            <a:spAutoFit/>
+          </a:bodyPr>
+          <a:lstStyle/>
+          <a:p>
+            <a:r>
+              <a:rPr lang="fr-FR" sz="3600" dirty="0">
+                <a:latin typeface="+mj-lt"/>
+              </a:rPr>
+              <a:t>20 €</a:t>
+            </a:r>
+          </a:p>
+        </p:txBody>
+      </p:sp>
+      <p:sp>
+        <p:nvSpPr>
+          <p:cNvPr id="14" name="ZoneTexte 13">
+            <a:extLst>
+              <a:ext uri="{FF2B5EF4-FFF2-40B4-BE49-F238E27FC236}">
+                <a16:creationId xmlns:a16="http://schemas.microsoft.com/office/drawing/2014/main" id="{271C60F8-E052-4D40-A60D-907B2A65E233}"/>
+              </a:ext>
+            </a:extLst>
+          </p:cNvPr>
+          <p:cNvSpPr txBox="1"/>
+          <p:nvPr/>
+        </p:nvSpPr>
+        <p:spPr>
+          <a:xfrm>
+            <a:off x="1149012" y="2719982"/>
+            <a:ext cx="990977" cy="646331"/>
+          </a:xfrm>
+          <a:prstGeom prst="rect">
+            <a:avLst/>
+          </a:prstGeom>
+          <a:noFill/>
+        </p:spPr>
+        <p:txBody>
+          <a:bodyPr wrap="none" rtlCol="0">
+            <a:spAutoFit/>
+          </a:bodyPr>
+          <a:lstStyle/>
+          <a:p>
+            <a:r>
+              <a:rPr lang="fr-FR" sz="3600" dirty="0">
+                <a:latin typeface="+mj-lt"/>
+              </a:rPr>
+              <a:t>40 €</a:t>
+            </a:r>
+          </a:p>
+        </p:txBody>
+      </p:sp>
+      <p:sp>
+        <p:nvSpPr>
+          <p:cNvPr id="15" name="ZoneTexte 14">
+            <a:extLst>
+              <a:ext uri="{FF2B5EF4-FFF2-40B4-BE49-F238E27FC236}">
+                <a16:creationId xmlns:a16="http://schemas.microsoft.com/office/drawing/2014/main" id="{F5736761-A948-4E56-99F7-16FCD358FA6E}"/>
+              </a:ext>
+            </a:extLst>
+          </p:cNvPr>
+          <p:cNvSpPr txBox="1"/>
+          <p:nvPr/>
+        </p:nvSpPr>
+        <p:spPr>
+          <a:xfrm>
+            <a:off x="1149012" y="3503938"/>
+            <a:ext cx="990977" cy="646331"/>
+          </a:xfrm>
+          <a:prstGeom prst="rect">
+            <a:avLst/>
+          </a:prstGeom>
+          <a:noFill/>
+        </p:spPr>
+        <p:txBody>
+          <a:bodyPr wrap="none" rtlCol="0">
+            <a:spAutoFit/>
+          </a:bodyPr>
+          <a:lstStyle/>
+          <a:p>
+            <a:r>
+              <a:rPr lang="fr-FR" sz="3600" dirty="0">
+                <a:latin typeface="+mj-lt"/>
+              </a:rPr>
+              <a:t>60 €</a:t>
+            </a:r>
+          </a:p>
+        </p:txBody>
+      </p:sp>
+      <p:sp>
+        <p:nvSpPr>
+          <p:cNvPr id="16" name="ZoneTexte 15">
+            <a:extLst>
+              <a:ext uri="{FF2B5EF4-FFF2-40B4-BE49-F238E27FC236}">
+                <a16:creationId xmlns:a16="http://schemas.microsoft.com/office/drawing/2014/main" id="{8A24A2EC-5D52-4CDE-8A08-249BEA876F01}"/>
+              </a:ext>
+            </a:extLst>
+          </p:cNvPr>
+          <p:cNvSpPr txBox="1"/>
+          <p:nvPr/>
+        </p:nvSpPr>
+        <p:spPr>
+          <a:xfrm>
+            <a:off x="1149012" y="4289048"/>
+            <a:ext cx="990977" cy="646331"/>
+          </a:xfrm>
+          <a:prstGeom prst="rect">
+            <a:avLst/>
+          </a:prstGeom>
+          <a:noFill/>
+        </p:spPr>
+        <p:txBody>
+          <a:bodyPr wrap="none" rtlCol="0">
+            <a:spAutoFit/>
+          </a:bodyPr>
+          <a:lstStyle/>
+          <a:p>
+            <a:r>
+              <a:rPr lang="fr-FR" sz="3600" dirty="0">
+                <a:latin typeface="+mj-lt"/>
+              </a:rPr>
+              <a:t>80 €</a:t>
+            </a:r>
+          </a:p>
+        </p:txBody>
+      </p:sp>
+      <p:sp>
+        <p:nvSpPr>
+          <p:cNvPr id="17" name="ZoneTexte 16">
+            <a:extLst>
+              <a:ext uri="{FF2B5EF4-FFF2-40B4-BE49-F238E27FC236}">
+                <a16:creationId xmlns:a16="http://schemas.microsoft.com/office/drawing/2014/main" id="{13AEC570-50F5-4162-AC7A-4A3382D33E1D}"/>
+              </a:ext>
+            </a:extLst>
+          </p:cNvPr>
+          <p:cNvSpPr txBox="1"/>
+          <p:nvPr/>
+        </p:nvSpPr>
+        <p:spPr>
+          <a:xfrm>
+            <a:off x="9991424" y="1916486"/>
+            <a:ext cx="1225015" cy="646331"/>
+          </a:xfrm>
+          <a:prstGeom prst="rect">
+            <a:avLst/>
+          </a:prstGeom>
+          <a:noFill/>
+        </p:spPr>
+        <p:txBody>
+          <a:bodyPr wrap="none" rtlCol="0">
+            <a:spAutoFit/>
+          </a:bodyPr>
+          <a:lstStyle/>
+          <a:p>
+            <a:r>
+              <a:rPr lang="fr-FR" sz="3600" dirty="0">
+                <a:latin typeface="+mj-lt"/>
+              </a:rPr>
+              <a:t>100 €</a:t>
+            </a:r>
+          </a:p>
+        </p:txBody>
+      </p:sp>
+      <p:sp>
+        <p:nvSpPr>
+          <p:cNvPr id="18" name="ZoneTexte 17">
+            <a:extLst>
+              <a:ext uri="{FF2B5EF4-FFF2-40B4-BE49-F238E27FC236}">
+                <a16:creationId xmlns:a16="http://schemas.microsoft.com/office/drawing/2014/main" id="{B23EADD2-774C-4929-8F1E-B6C9BF48CE22}"/>
+              </a:ext>
+            </a:extLst>
+          </p:cNvPr>
+          <p:cNvSpPr txBox="1"/>
+          <p:nvPr/>
+        </p:nvSpPr>
+        <p:spPr>
+          <a:xfrm>
+            <a:off x="9930602" y="2719982"/>
+            <a:ext cx="1225015" cy="646331"/>
+          </a:xfrm>
+          <a:prstGeom prst="rect">
+            <a:avLst/>
+          </a:prstGeom>
+          <a:noFill/>
+        </p:spPr>
+        <p:txBody>
+          <a:bodyPr wrap="none" rtlCol="0">
+            <a:spAutoFit/>
+          </a:bodyPr>
+          <a:lstStyle/>
+          <a:p>
+            <a:r>
+              <a:rPr lang="fr-FR" sz="3600" dirty="0">
+                <a:latin typeface="+mj-lt"/>
+              </a:rPr>
+              <a:t>140 €</a:t>
+            </a:r>
+          </a:p>
+        </p:txBody>
+      </p:sp>
+      <p:sp>
+        <p:nvSpPr>
+          <p:cNvPr id="19" name="ZoneTexte 18">
+            <a:extLst>
+              <a:ext uri="{FF2B5EF4-FFF2-40B4-BE49-F238E27FC236}">
+                <a16:creationId xmlns:a16="http://schemas.microsoft.com/office/drawing/2014/main" id="{814DC081-5593-426E-B1F3-E1FF1E72FA6D}"/>
+              </a:ext>
+            </a:extLst>
+          </p:cNvPr>
+          <p:cNvSpPr txBox="1"/>
+          <p:nvPr/>
+        </p:nvSpPr>
+        <p:spPr>
+          <a:xfrm>
+            <a:off x="9930601" y="3503938"/>
+            <a:ext cx="1225015" cy="646331"/>
+          </a:xfrm>
+          <a:prstGeom prst="rect">
+            <a:avLst/>
+          </a:prstGeom>
+          <a:noFill/>
+        </p:spPr>
+        <p:txBody>
+          <a:bodyPr wrap="none" rtlCol="0">
+            <a:spAutoFit/>
+          </a:bodyPr>
+          <a:lstStyle/>
+          <a:p>
+            <a:r>
+              <a:rPr lang="fr-FR" sz="3600" dirty="0">
+                <a:latin typeface="+mj-lt"/>
+              </a:rPr>
+              <a:t>200 €</a:t>
+            </a:r>
+          </a:p>
+        </p:txBody>
+      </p:sp>
+      <p:sp>
+        <p:nvSpPr>
+          <p:cNvPr id="20" name="ZoneTexte 19">
+            <a:extLst>
+              <a:ext uri="{FF2B5EF4-FFF2-40B4-BE49-F238E27FC236}">
+                <a16:creationId xmlns:a16="http://schemas.microsoft.com/office/drawing/2014/main" id="{242E43C0-3F59-4EC0-9197-FED1A1702D88}"/>
+              </a:ext>
+            </a:extLst>
+          </p:cNvPr>
+          <p:cNvSpPr txBox="1"/>
+          <p:nvPr/>
+        </p:nvSpPr>
+        <p:spPr>
+          <a:xfrm>
+            <a:off x="8269286" y="4289048"/>
+            <a:ext cx="2947153" cy="646331"/>
+          </a:xfrm>
+          <a:prstGeom prst="rect">
+            <a:avLst/>
+          </a:prstGeom>
+          <a:noFill/>
+        </p:spPr>
+        <p:txBody>
+          <a:bodyPr wrap="none" rtlCol="0">
+            <a:spAutoFit/>
+          </a:bodyPr>
+          <a:lstStyle/>
+          <a:p>
+            <a:r>
+              <a:rPr lang="fr-FR" sz="3600" dirty="0">
+                <a:latin typeface="+mj-lt"/>
+              </a:rPr>
+              <a:t>Autre montant</a:t>
+            </a:r>
+          </a:p>
+        </p:txBody>
+      </p:sp>
+      <p:sp>
+        <p:nvSpPr>
+          <p:cNvPr id="23" name="Rectangle 22">
+            <a:extLst>
+              <a:ext uri="{FF2B5EF4-FFF2-40B4-BE49-F238E27FC236}">
+                <a16:creationId xmlns:a16="http://schemas.microsoft.com/office/drawing/2014/main" id="{D8CCB32B-0EC4-4882-9F93-04F634A68CE2}"/>
               </a:ext>
             </a:extLst>
           </p:cNvPr>
@@ -12065,10 +12967,10 @@
       </p:sp>
       <p:sp>
         <p:nvSpPr>
-          <p:cNvPr id="23" name="ZoneTexte 22">
-            <a:extLst>
-              <a:ext uri="{FF2B5EF4-FFF2-40B4-BE49-F238E27FC236}">
-                <a16:creationId xmlns:a16="http://schemas.microsoft.com/office/drawing/2014/main" id="{0F113D50-507A-48F0-B639-910ECB5DFFA3}"/>
+          <p:cNvPr id="30" name="ZoneTexte 29">
+            <a:extLst>
+              <a:ext uri="{FF2B5EF4-FFF2-40B4-BE49-F238E27FC236}">
+                <a16:creationId xmlns:a16="http://schemas.microsoft.com/office/drawing/2014/main" id="{28D25877-F26A-4C02-B872-5FFFA9B2569D}"/>
               </a:ext>
             </a:extLst>
           </p:cNvPr>
@@ -12077,8 +12979,8 @@
         </p:nvSpPr>
         <p:spPr>
           <a:xfrm>
-            <a:off x="9203637" y="5520344"/>
-            <a:ext cx="1925527" cy="646331"/>
+            <a:off x="6200273" y="5580265"/>
+            <a:ext cx="5041765" cy="523220"/>
           </a:xfrm>
           <a:prstGeom prst="rect">
             <a:avLst/>
@@ -12092,1011 +12994,14 @@
           <a:lstStyle/>
           <a:p>
             <a:r>
-              <a:rPr lang="fr-FR" sz="3600" dirty="0">
+              <a:rPr lang="fr-FR" sz="2800" dirty="0">
                 <a:solidFill>
                   <a:schemeClr val="bg1"/>
                 </a:solidFill>
                 <a:latin typeface="Roboto Light" panose="02000000000000000000" pitchFamily="2" charset="0"/>
                 <a:ea typeface="Roboto Light" panose="02000000000000000000" pitchFamily="2" charset="0"/>
               </a:rPr>
-              <a:t>RETOUR</a:t>
-            </a:r>
-          </a:p>
-        </p:txBody>
-      </p:sp>
-    </p:spTree>
-    <p:extLst>
-      <p:ext uri="{BB962C8B-B14F-4D97-AF65-F5344CB8AC3E}">
-        <p14:creationId xmlns:p14="http://schemas.microsoft.com/office/powerpoint/2010/main" val="913850948"/>
-      </p:ext>
-    </p:extLst>
-  </p:cSld>
-  <p:clrMapOvr>
-    <a:masterClrMapping/>
-  </p:clrMapOvr>
-</p:sld>
-</file>
-
-<file path=ppt/slides/slide8.xml><?xml version="1.0" encoding="utf-8"?>
-<p:sld xmlns:a="http://schemas.openxmlformats.org/drawingml/2006/main" xmlns:r="http://schemas.openxmlformats.org/officeDocument/2006/relationships" xmlns:p="http://schemas.openxmlformats.org/presentationml/2006/main">
-  <p:cSld>
-    <p:spTree>
-      <p:nvGrpSpPr>
-        <p:cNvPr id="1" name=""/>
-        <p:cNvGrpSpPr/>
-        <p:nvPr/>
-      </p:nvGrpSpPr>
-      <p:grpSpPr>
-        <a:xfrm>
-          <a:off x="0" y="0"/>
-          <a:ext cx="0" cy="0"/>
-          <a:chOff x="0" y="0"/>
-          <a:chExt cx="0" cy="0"/>
-        </a:xfrm>
-      </p:grpSpPr>
-      <p:sp>
-        <p:nvSpPr>
-          <p:cNvPr id="24" name="Rectangle 23">
-            <a:extLst>
-              <a:ext uri="{FF2B5EF4-FFF2-40B4-BE49-F238E27FC236}">
-                <a16:creationId xmlns:a16="http://schemas.microsoft.com/office/drawing/2014/main" id="{5B7C57DF-994F-4DE6-9A12-3BE139AED216}"/>
-              </a:ext>
-            </a:extLst>
-          </p:cNvPr>
-          <p:cNvSpPr/>
-          <p:nvPr/>
-        </p:nvSpPr>
-        <p:spPr>
-          <a:xfrm>
-            <a:off x="6191690" y="1928621"/>
-            <a:ext cx="5029200" cy="646331"/>
-          </a:xfrm>
-          <a:prstGeom prst="rect">
-            <a:avLst/>
-          </a:prstGeom>
-          <a:solidFill>
-            <a:srgbClr val="43B6C5">
-              <a:alpha val="63137"/>
-            </a:srgbClr>
-          </a:solidFill>
-          <a:ln>
-            <a:noFill/>
-          </a:ln>
-        </p:spPr>
-        <p:style>
-          <a:lnRef idx="2">
-            <a:schemeClr val="accent1">
-              <a:shade val="50000"/>
-            </a:schemeClr>
-          </a:lnRef>
-          <a:fillRef idx="1">
-            <a:schemeClr val="accent1"/>
-          </a:fillRef>
-          <a:effectRef idx="0">
-            <a:schemeClr val="accent1"/>
-          </a:effectRef>
-          <a:fontRef idx="minor">
-            <a:schemeClr val="lt1"/>
-          </a:fontRef>
-        </p:style>
-        <p:txBody>
-          <a:bodyPr rtlCol="0" anchor="ctr"/>
-          <a:lstStyle/>
-          <a:p>
-            <a:pPr algn="ctr"/>
-            <a:endParaRPr lang="fr-FR" dirty="0">
-              <a:latin typeface="+mj-lt"/>
-            </a:endParaRPr>
-          </a:p>
-        </p:txBody>
-      </p:sp>
-      <p:sp>
-        <p:nvSpPr>
-          <p:cNvPr id="25" name="Rectangle 24">
-            <a:extLst>
-              <a:ext uri="{FF2B5EF4-FFF2-40B4-BE49-F238E27FC236}">
-                <a16:creationId xmlns:a16="http://schemas.microsoft.com/office/drawing/2014/main" id="{DE001D6B-24E7-4F70-90C7-1B932407304A}"/>
-              </a:ext>
-            </a:extLst>
-          </p:cNvPr>
-          <p:cNvSpPr/>
-          <p:nvPr/>
-        </p:nvSpPr>
-        <p:spPr>
-          <a:xfrm>
-            <a:off x="6191690" y="2718828"/>
-            <a:ext cx="5029200" cy="646331"/>
-          </a:xfrm>
-          <a:prstGeom prst="rect">
-            <a:avLst/>
-          </a:prstGeom>
-          <a:solidFill>
-            <a:srgbClr val="43B6C5">
-              <a:alpha val="63137"/>
-            </a:srgbClr>
-          </a:solidFill>
-          <a:ln>
-            <a:noFill/>
-          </a:ln>
-        </p:spPr>
-        <p:style>
-          <a:lnRef idx="2">
-            <a:schemeClr val="accent1">
-              <a:shade val="50000"/>
-            </a:schemeClr>
-          </a:lnRef>
-          <a:fillRef idx="1">
-            <a:schemeClr val="accent1"/>
-          </a:fillRef>
-          <a:effectRef idx="0">
-            <a:schemeClr val="accent1"/>
-          </a:effectRef>
-          <a:fontRef idx="minor">
-            <a:schemeClr val="lt1"/>
-          </a:fontRef>
-        </p:style>
-        <p:txBody>
-          <a:bodyPr rtlCol="0" anchor="ctr"/>
-          <a:lstStyle/>
-          <a:p>
-            <a:pPr algn="ctr"/>
-            <a:endParaRPr lang="fr-FR">
-              <a:latin typeface="+mj-lt"/>
-            </a:endParaRPr>
-          </a:p>
-        </p:txBody>
-      </p:sp>
-      <p:sp>
-        <p:nvSpPr>
-          <p:cNvPr id="26" name="Rectangle 25">
-            <a:extLst>
-              <a:ext uri="{FF2B5EF4-FFF2-40B4-BE49-F238E27FC236}">
-                <a16:creationId xmlns:a16="http://schemas.microsoft.com/office/drawing/2014/main" id="{AD7E78B4-EB3E-4A69-B2CF-6F4C95B73B29}"/>
-              </a:ext>
-            </a:extLst>
-          </p:cNvPr>
-          <p:cNvSpPr/>
-          <p:nvPr/>
-        </p:nvSpPr>
-        <p:spPr>
-          <a:xfrm>
-            <a:off x="6191690" y="3509035"/>
-            <a:ext cx="5029200" cy="646331"/>
-          </a:xfrm>
-          <a:prstGeom prst="rect">
-            <a:avLst/>
-          </a:prstGeom>
-          <a:solidFill>
-            <a:srgbClr val="43B6C5">
-              <a:alpha val="63137"/>
-            </a:srgbClr>
-          </a:solidFill>
-          <a:ln>
-            <a:noFill/>
-          </a:ln>
-        </p:spPr>
-        <p:style>
-          <a:lnRef idx="2">
-            <a:schemeClr val="accent1">
-              <a:shade val="50000"/>
-            </a:schemeClr>
-          </a:lnRef>
-          <a:fillRef idx="1">
-            <a:schemeClr val="accent1"/>
-          </a:fillRef>
-          <a:effectRef idx="0">
-            <a:schemeClr val="accent1"/>
-          </a:effectRef>
-          <a:fontRef idx="minor">
-            <a:schemeClr val="lt1"/>
-          </a:fontRef>
-        </p:style>
-        <p:txBody>
-          <a:bodyPr rtlCol="0" anchor="ctr"/>
-          <a:lstStyle/>
-          <a:p>
-            <a:pPr algn="ctr"/>
-            <a:endParaRPr lang="fr-FR">
-              <a:latin typeface="+mj-lt"/>
-            </a:endParaRPr>
-          </a:p>
-        </p:txBody>
-      </p:sp>
-      <p:sp>
-        <p:nvSpPr>
-          <p:cNvPr id="27" name="Rectangle 26">
-            <a:extLst>
-              <a:ext uri="{FF2B5EF4-FFF2-40B4-BE49-F238E27FC236}">
-                <a16:creationId xmlns:a16="http://schemas.microsoft.com/office/drawing/2014/main" id="{72F83B2A-7E96-4ECC-96E5-A11584DCE89A}"/>
-              </a:ext>
-            </a:extLst>
-          </p:cNvPr>
-          <p:cNvSpPr/>
-          <p:nvPr/>
-        </p:nvSpPr>
-        <p:spPr>
-          <a:xfrm>
-            <a:off x="6191690" y="4299242"/>
-            <a:ext cx="5029200" cy="646331"/>
-          </a:xfrm>
-          <a:prstGeom prst="rect">
-            <a:avLst/>
-          </a:prstGeom>
-          <a:solidFill>
-            <a:srgbClr val="43B6C5">
-              <a:alpha val="63137"/>
-            </a:srgbClr>
-          </a:solidFill>
-          <a:ln>
-            <a:noFill/>
-          </a:ln>
-        </p:spPr>
-        <p:style>
-          <a:lnRef idx="2">
-            <a:schemeClr val="accent1">
-              <a:shade val="50000"/>
-            </a:schemeClr>
-          </a:lnRef>
-          <a:fillRef idx="1">
-            <a:schemeClr val="accent1"/>
-          </a:fillRef>
-          <a:effectRef idx="0">
-            <a:schemeClr val="accent1"/>
-          </a:effectRef>
-          <a:fontRef idx="minor">
-            <a:schemeClr val="lt1"/>
-          </a:fontRef>
-        </p:style>
-        <p:txBody>
-          <a:bodyPr rtlCol="0" anchor="ctr"/>
-          <a:lstStyle/>
-          <a:p>
-            <a:pPr algn="ctr"/>
-            <a:endParaRPr lang="fr-FR">
-              <a:latin typeface="+mj-lt"/>
-            </a:endParaRPr>
-          </a:p>
-        </p:txBody>
-      </p:sp>
-      <p:sp>
-        <p:nvSpPr>
-          <p:cNvPr id="3" name="Rectangle 2">
-            <a:extLst>
-              <a:ext uri="{FF2B5EF4-FFF2-40B4-BE49-F238E27FC236}">
-                <a16:creationId xmlns:a16="http://schemas.microsoft.com/office/drawing/2014/main" id="{2E8E3367-571F-486C-80AB-043BF71E1C3E}"/>
-              </a:ext>
-            </a:extLst>
-          </p:cNvPr>
-          <p:cNvSpPr/>
-          <p:nvPr/>
-        </p:nvSpPr>
-        <p:spPr>
-          <a:xfrm>
-            <a:off x="705853" y="465221"/>
-            <a:ext cx="10780295" cy="5927558"/>
-          </a:xfrm>
-          <a:prstGeom prst="rect">
-            <a:avLst/>
-          </a:prstGeom>
-          <a:noFill/>
-          <a:ln w="57150">
-            <a:solidFill>
-              <a:srgbClr val="FFC000"/>
-            </a:solidFill>
-          </a:ln>
-        </p:spPr>
-        <p:style>
-          <a:lnRef idx="2">
-            <a:schemeClr val="accent1">
-              <a:shade val="50000"/>
-            </a:schemeClr>
-          </a:lnRef>
-          <a:fillRef idx="1">
-            <a:schemeClr val="accent1"/>
-          </a:fillRef>
-          <a:effectRef idx="0">
-            <a:schemeClr val="accent1"/>
-          </a:effectRef>
-          <a:fontRef idx="minor">
-            <a:schemeClr val="lt1"/>
-          </a:fontRef>
-        </p:style>
-        <p:txBody>
-          <a:bodyPr rtlCol="0" anchor="ctr"/>
-          <a:lstStyle/>
-          <a:p>
-            <a:pPr algn="ctr"/>
-            <a:endParaRPr lang="fr-FR">
-              <a:latin typeface="+mj-lt"/>
-            </a:endParaRPr>
-          </a:p>
-        </p:txBody>
-      </p:sp>
-      <p:sp>
-        <p:nvSpPr>
-          <p:cNvPr id="2" name="Titre 1">
-            <a:extLst>
-              <a:ext uri="{FF2B5EF4-FFF2-40B4-BE49-F238E27FC236}">
-                <a16:creationId xmlns:a16="http://schemas.microsoft.com/office/drawing/2014/main" id="{D738593F-B18F-4600-AF47-F18EDBE0844C}"/>
-              </a:ext>
-            </a:extLst>
-          </p:cNvPr>
-          <p:cNvSpPr>
-            <a:spLocks noGrp="1"/>
-          </p:cNvSpPr>
-          <p:nvPr>
-            <p:ph type="title"/>
-          </p:nvPr>
-        </p:nvSpPr>
-        <p:spPr>
-          <a:xfrm>
-            <a:off x="838200" y="520079"/>
-            <a:ext cx="10515600" cy="1325563"/>
-          </a:xfrm>
-        </p:spPr>
-        <p:txBody>
-          <a:bodyPr/>
-          <a:lstStyle/>
-          <a:p>
-            <a:pPr algn="ctr"/>
-            <a:r>
-              <a:rPr lang="fr-FR" dirty="0"/>
-              <a:t>Sélectionner le montant</a:t>
-            </a:r>
-          </a:p>
-        </p:txBody>
-      </p:sp>
-      <p:sp>
-        <p:nvSpPr>
-          <p:cNvPr id="4" name="ZoneTexte 3">
-            <a:extLst>
-              <a:ext uri="{FF2B5EF4-FFF2-40B4-BE49-F238E27FC236}">
-                <a16:creationId xmlns:a16="http://schemas.microsoft.com/office/drawing/2014/main" id="{5B2C0825-ABD4-4F7B-8EA3-9F95BAA7C9AC}"/>
-              </a:ext>
-            </a:extLst>
-          </p:cNvPr>
-          <p:cNvSpPr txBox="1"/>
-          <p:nvPr/>
-        </p:nvSpPr>
-        <p:spPr>
-          <a:xfrm>
-            <a:off x="705853" y="63987"/>
-            <a:ext cx="2588657" cy="369332"/>
-          </a:xfrm>
-          <a:prstGeom prst="rect">
-            <a:avLst/>
-          </a:prstGeom>
-          <a:noFill/>
-        </p:spPr>
-        <p:txBody>
-          <a:bodyPr wrap="none" rtlCol="0">
-            <a:spAutoFit/>
-          </a:bodyPr>
-          <a:lstStyle/>
-          <a:p>
-            <a:r>
-              <a:rPr lang="fr-FR" dirty="0">
-                <a:latin typeface="+mj-lt"/>
-              </a:rPr>
-              <a:t>Ecran : Sélection montant</a:t>
-            </a:r>
-          </a:p>
-        </p:txBody>
-      </p:sp>
-      <p:sp>
-        <p:nvSpPr>
-          <p:cNvPr id="5" name="Rectangle 4">
-            <a:extLst>
-              <a:ext uri="{FF2B5EF4-FFF2-40B4-BE49-F238E27FC236}">
-                <a16:creationId xmlns:a16="http://schemas.microsoft.com/office/drawing/2014/main" id="{3A2D216E-7958-48BE-8D9B-61354C883A06}"/>
-              </a:ext>
-            </a:extLst>
-          </p:cNvPr>
-          <p:cNvSpPr/>
-          <p:nvPr/>
-        </p:nvSpPr>
-        <p:spPr>
-          <a:xfrm>
-            <a:off x="975561" y="1928621"/>
-            <a:ext cx="5029200" cy="646331"/>
-          </a:xfrm>
-          <a:prstGeom prst="rect">
-            <a:avLst/>
-          </a:prstGeom>
-          <a:solidFill>
-            <a:srgbClr val="43B6C5">
-              <a:alpha val="63137"/>
-            </a:srgbClr>
-          </a:solidFill>
-          <a:ln>
-            <a:noFill/>
-          </a:ln>
-        </p:spPr>
-        <p:style>
-          <a:lnRef idx="2">
-            <a:schemeClr val="accent1">
-              <a:shade val="50000"/>
-            </a:schemeClr>
-          </a:lnRef>
-          <a:fillRef idx="1">
-            <a:schemeClr val="accent1"/>
-          </a:fillRef>
-          <a:effectRef idx="0">
-            <a:schemeClr val="accent1"/>
-          </a:effectRef>
-          <a:fontRef idx="minor">
-            <a:schemeClr val="lt1"/>
-          </a:fontRef>
-        </p:style>
-        <p:txBody>
-          <a:bodyPr rtlCol="0" anchor="ctr"/>
-          <a:lstStyle/>
-          <a:p>
-            <a:pPr algn="ctr"/>
-            <a:endParaRPr lang="fr-FR" dirty="0">
-              <a:latin typeface="+mj-lt"/>
-            </a:endParaRPr>
-          </a:p>
-        </p:txBody>
-      </p:sp>
-      <p:sp>
-        <p:nvSpPr>
-          <p:cNvPr id="7" name="Rectangle 6">
-            <a:extLst>
-              <a:ext uri="{FF2B5EF4-FFF2-40B4-BE49-F238E27FC236}">
-                <a16:creationId xmlns:a16="http://schemas.microsoft.com/office/drawing/2014/main" id="{6D1494D5-3EBC-4916-8D8B-26C38EAC8079}"/>
-              </a:ext>
-            </a:extLst>
-          </p:cNvPr>
-          <p:cNvSpPr/>
-          <p:nvPr/>
-        </p:nvSpPr>
-        <p:spPr>
-          <a:xfrm>
-            <a:off x="975561" y="2718828"/>
-            <a:ext cx="5029200" cy="646331"/>
-          </a:xfrm>
-          <a:prstGeom prst="rect">
-            <a:avLst/>
-          </a:prstGeom>
-          <a:solidFill>
-            <a:srgbClr val="43B6C5">
-              <a:alpha val="63137"/>
-            </a:srgbClr>
-          </a:solidFill>
-          <a:ln>
-            <a:noFill/>
-          </a:ln>
-        </p:spPr>
-        <p:style>
-          <a:lnRef idx="2">
-            <a:schemeClr val="accent1">
-              <a:shade val="50000"/>
-            </a:schemeClr>
-          </a:lnRef>
-          <a:fillRef idx="1">
-            <a:schemeClr val="accent1"/>
-          </a:fillRef>
-          <a:effectRef idx="0">
-            <a:schemeClr val="accent1"/>
-          </a:effectRef>
-          <a:fontRef idx="minor">
-            <a:schemeClr val="lt1"/>
-          </a:fontRef>
-        </p:style>
-        <p:txBody>
-          <a:bodyPr rtlCol="0" anchor="ctr"/>
-          <a:lstStyle/>
-          <a:p>
-            <a:pPr algn="ctr"/>
-            <a:endParaRPr lang="fr-FR">
-              <a:latin typeface="+mj-lt"/>
-            </a:endParaRPr>
-          </a:p>
-        </p:txBody>
-      </p:sp>
-      <p:sp>
-        <p:nvSpPr>
-          <p:cNvPr id="9" name="Rectangle 8">
-            <a:extLst>
-              <a:ext uri="{FF2B5EF4-FFF2-40B4-BE49-F238E27FC236}">
-                <a16:creationId xmlns:a16="http://schemas.microsoft.com/office/drawing/2014/main" id="{09C4F6D1-11FF-4A97-BDF1-53DFC43534D2}"/>
-              </a:ext>
-            </a:extLst>
-          </p:cNvPr>
-          <p:cNvSpPr/>
-          <p:nvPr/>
-        </p:nvSpPr>
-        <p:spPr>
-          <a:xfrm>
-            <a:off x="975561" y="3509035"/>
-            <a:ext cx="5029200" cy="646331"/>
-          </a:xfrm>
-          <a:prstGeom prst="rect">
-            <a:avLst/>
-          </a:prstGeom>
-          <a:solidFill>
-            <a:srgbClr val="43B6C5">
-              <a:alpha val="63137"/>
-            </a:srgbClr>
-          </a:solidFill>
-          <a:ln>
-            <a:noFill/>
-          </a:ln>
-        </p:spPr>
-        <p:style>
-          <a:lnRef idx="2">
-            <a:schemeClr val="accent1">
-              <a:shade val="50000"/>
-            </a:schemeClr>
-          </a:lnRef>
-          <a:fillRef idx="1">
-            <a:schemeClr val="accent1"/>
-          </a:fillRef>
-          <a:effectRef idx="0">
-            <a:schemeClr val="accent1"/>
-          </a:effectRef>
-          <a:fontRef idx="minor">
-            <a:schemeClr val="lt1"/>
-          </a:fontRef>
-        </p:style>
-        <p:txBody>
-          <a:bodyPr rtlCol="0" anchor="ctr"/>
-          <a:lstStyle/>
-          <a:p>
-            <a:pPr algn="ctr"/>
-            <a:endParaRPr lang="fr-FR">
-              <a:latin typeface="+mj-lt"/>
-            </a:endParaRPr>
-          </a:p>
-        </p:txBody>
-      </p:sp>
-      <p:sp>
-        <p:nvSpPr>
-          <p:cNvPr id="11" name="Rectangle 10">
-            <a:extLst>
-              <a:ext uri="{FF2B5EF4-FFF2-40B4-BE49-F238E27FC236}">
-                <a16:creationId xmlns:a16="http://schemas.microsoft.com/office/drawing/2014/main" id="{080A5065-1FD5-4FFB-A04F-19FC967106AB}"/>
-              </a:ext>
-            </a:extLst>
-          </p:cNvPr>
-          <p:cNvSpPr/>
-          <p:nvPr/>
-        </p:nvSpPr>
-        <p:spPr>
-          <a:xfrm>
-            <a:off x="975561" y="4299242"/>
-            <a:ext cx="5029200" cy="646331"/>
-          </a:xfrm>
-          <a:prstGeom prst="rect">
-            <a:avLst/>
-          </a:prstGeom>
-          <a:solidFill>
-            <a:srgbClr val="43B6C5">
-              <a:alpha val="63137"/>
-            </a:srgbClr>
-          </a:solidFill>
-          <a:ln>
-            <a:noFill/>
-          </a:ln>
-        </p:spPr>
-        <p:style>
-          <a:lnRef idx="2">
-            <a:schemeClr val="accent1">
-              <a:shade val="50000"/>
-            </a:schemeClr>
-          </a:lnRef>
-          <a:fillRef idx="1">
-            <a:schemeClr val="accent1"/>
-          </a:fillRef>
-          <a:effectRef idx="0">
-            <a:schemeClr val="accent1"/>
-          </a:effectRef>
-          <a:fontRef idx="minor">
-            <a:schemeClr val="lt1"/>
-          </a:fontRef>
-        </p:style>
-        <p:txBody>
-          <a:bodyPr rtlCol="0" anchor="ctr"/>
-          <a:lstStyle/>
-          <a:p>
-            <a:pPr algn="ctr"/>
-            <a:endParaRPr lang="fr-FR">
-              <a:latin typeface="+mj-lt"/>
-            </a:endParaRPr>
-          </a:p>
-        </p:txBody>
-      </p:sp>
-      <p:sp>
-        <p:nvSpPr>
-          <p:cNvPr id="13" name="ZoneTexte 12">
-            <a:extLst>
-              <a:ext uri="{FF2B5EF4-FFF2-40B4-BE49-F238E27FC236}">
-                <a16:creationId xmlns:a16="http://schemas.microsoft.com/office/drawing/2014/main" id="{FB528374-D78D-471A-93B2-FF58DA6BF514}"/>
-              </a:ext>
-            </a:extLst>
-          </p:cNvPr>
-          <p:cNvSpPr txBox="1"/>
-          <p:nvPr/>
-        </p:nvSpPr>
-        <p:spPr>
-          <a:xfrm>
-            <a:off x="1149012" y="1916486"/>
-            <a:ext cx="990977" cy="646331"/>
-          </a:xfrm>
-          <a:prstGeom prst="rect">
-            <a:avLst/>
-          </a:prstGeom>
-          <a:noFill/>
-        </p:spPr>
-        <p:txBody>
-          <a:bodyPr wrap="none" rtlCol="0">
-            <a:spAutoFit/>
-          </a:bodyPr>
-          <a:lstStyle/>
-          <a:p>
-            <a:r>
-              <a:rPr lang="fr-FR" sz="3600" dirty="0">
-                <a:latin typeface="+mj-lt"/>
-              </a:rPr>
-              <a:t>20 €</a:t>
-            </a:r>
-          </a:p>
-        </p:txBody>
-      </p:sp>
-      <p:sp>
-        <p:nvSpPr>
-          <p:cNvPr id="14" name="ZoneTexte 13">
-            <a:extLst>
-              <a:ext uri="{FF2B5EF4-FFF2-40B4-BE49-F238E27FC236}">
-                <a16:creationId xmlns:a16="http://schemas.microsoft.com/office/drawing/2014/main" id="{271C60F8-E052-4D40-A60D-907B2A65E233}"/>
-              </a:ext>
-            </a:extLst>
-          </p:cNvPr>
-          <p:cNvSpPr txBox="1"/>
-          <p:nvPr/>
-        </p:nvSpPr>
-        <p:spPr>
-          <a:xfrm>
-            <a:off x="1149012" y="2719982"/>
-            <a:ext cx="990977" cy="646331"/>
-          </a:xfrm>
-          <a:prstGeom prst="rect">
-            <a:avLst/>
-          </a:prstGeom>
-          <a:noFill/>
-        </p:spPr>
-        <p:txBody>
-          <a:bodyPr wrap="none" rtlCol="0">
-            <a:spAutoFit/>
-          </a:bodyPr>
-          <a:lstStyle/>
-          <a:p>
-            <a:r>
-              <a:rPr lang="fr-FR" sz="3600" dirty="0">
-                <a:latin typeface="+mj-lt"/>
-              </a:rPr>
-              <a:t>40 €</a:t>
-            </a:r>
-          </a:p>
-        </p:txBody>
-      </p:sp>
-      <p:sp>
-        <p:nvSpPr>
-          <p:cNvPr id="15" name="ZoneTexte 14">
-            <a:extLst>
-              <a:ext uri="{FF2B5EF4-FFF2-40B4-BE49-F238E27FC236}">
-                <a16:creationId xmlns:a16="http://schemas.microsoft.com/office/drawing/2014/main" id="{F5736761-A948-4E56-99F7-16FCD358FA6E}"/>
-              </a:ext>
-            </a:extLst>
-          </p:cNvPr>
-          <p:cNvSpPr txBox="1"/>
-          <p:nvPr/>
-        </p:nvSpPr>
-        <p:spPr>
-          <a:xfrm>
-            <a:off x="1149012" y="3503938"/>
-            <a:ext cx="990977" cy="646331"/>
-          </a:xfrm>
-          <a:prstGeom prst="rect">
-            <a:avLst/>
-          </a:prstGeom>
-          <a:noFill/>
-        </p:spPr>
-        <p:txBody>
-          <a:bodyPr wrap="none" rtlCol="0">
-            <a:spAutoFit/>
-          </a:bodyPr>
-          <a:lstStyle/>
-          <a:p>
-            <a:r>
-              <a:rPr lang="fr-FR" sz="3600" dirty="0">
-                <a:latin typeface="+mj-lt"/>
-              </a:rPr>
-              <a:t>60 €</a:t>
-            </a:r>
-          </a:p>
-        </p:txBody>
-      </p:sp>
-      <p:sp>
-        <p:nvSpPr>
-          <p:cNvPr id="16" name="ZoneTexte 15">
-            <a:extLst>
-              <a:ext uri="{FF2B5EF4-FFF2-40B4-BE49-F238E27FC236}">
-                <a16:creationId xmlns:a16="http://schemas.microsoft.com/office/drawing/2014/main" id="{8A24A2EC-5D52-4CDE-8A08-249BEA876F01}"/>
-              </a:ext>
-            </a:extLst>
-          </p:cNvPr>
-          <p:cNvSpPr txBox="1"/>
-          <p:nvPr/>
-        </p:nvSpPr>
-        <p:spPr>
-          <a:xfrm>
-            <a:off x="1149012" y="4289048"/>
-            <a:ext cx="990977" cy="646331"/>
-          </a:xfrm>
-          <a:prstGeom prst="rect">
-            <a:avLst/>
-          </a:prstGeom>
-          <a:noFill/>
-        </p:spPr>
-        <p:txBody>
-          <a:bodyPr wrap="none" rtlCol="0">
-            <a:spAutoFit/>
-          </a:bodyPr>
-          <a:lstStyle/>
-          <a:p>
-            <a:r>
-              <a:rPr lang="fr-FR" sz="3600" dirty="0">
-                <a:latin typeface="+mj-lt"/>
-              </a:rPr>
-              <a:t>80 €</a:t>
-            </a:r>
-          </a:p>
-        </p:txBody>
-      </p:sp>
-      <p:sp>
-        <p:nvSpPr>
-          <p:cNvPr id="17" name="ZoneTexte 16">
-            <a:extLst>
-              <a:ext uri="{FF2B5EF4-FFF2-40B4-BE49-F238E27FC236}">
-                <a16:creationId xmlns:a16="http://schemas.microsoft.com/office/drawing/2014/main" id="{13AEC570-50F5-4162-AC7A-4A3382D33E1D}"/>
-              </a:ext>
-            </a:extLst>
-          </p:cNvPr>
-          <p:cNvSpPr txBox="1"/>
-          <p:nvPr/>
-        </p:nvSpPr>
-        <p:spPr>
-          <a:xfrm>
-            <a:off x="9991424" y="1916486"/>
-            <a:ext cx="1225015" cy="646331"/>
-          </a:xfrm>
-          <a:prstGeom prst="rect">
-            <a:avLst/>
-          </a:prstGeom>
-          <a:noFill/>
-        </p:spPr>
-        <p:txBody>
-          <a:bodyPr wrap="none" rtlCol="0">
-            <a:spAutoFit/>
-          </a:bodyPr>
-          <a:lstStyle/>
-          <a:p>
-            <a:r>
-              <a:rPr lang="fr-FR" sz="3600" dirty="0">
-                <a:latin typeface="+mj-lt"/>
-              </a:rPr>
-              <a:t>100 €</a:t>
-            </a:r>
-          </a:p>
-        </p:txBody>
-      </p:sp>
-      <p:sp>
-        <p:nvSpPr>
-          <p:cNvPr id="18" name="ZoneTexte 17">
-            <a:extLst>
-              <a:ext uri="{FF2B5EF4-FFF2-40B4-BE49-F238E27FC236}">
-                <a16:creationId xmlns:a16="http://schemas.microsoft.com/office/drawing/2014/main" id="{B23EADD2-774C-4929-8F1E-B6C9BF48CE22}"/>
-              </a:ext>
-            </a:extLst>
-          </p:cNvPr>
-          <p:cNvSpPr txBox="1"/>
-          <p:nvPr/>
-        </p:nvSpPr>
-        <p:spPr>
-          <a:xfrm>
-            <a:off x="9930602" y="2719982"/>
-            <a:ext cx="1225015" cy="646331"/>
-          </a:xfrm>
-          <a:prstGeom prst="rect">
-            <a:avLst/>
-          </a:prstGeom>
-          <a:noFill/>
-        </p:spPr>
-        <p:txBody>
-          <a:bodyPr wrap="none" rtlCol="0">
-            <a:spAutoFit/>
-          </a:bodyPr>
-          <a:lstStyle/>
-          <a:p>
-            <a:r>
-              <a:rPr lang="fr-FR" sz="3600" dirty="0">
-                <a:latin typeface="+mj-lt"/>
-              </a:rPr>
-              <a:t>140 €</a:t>
-            </a:r>
-          </a:p>
-        </p:txBody>
-      </p:sp>
-      <p:sp>
-        <p:nvSpPr>
-          <p:cNvPr id="19" name="ZoneTexte 18">
-            <a:extLst>
-              <a:ext uri="{FF2B5EF4-FFF2-40B4-BE49-F238E27FC236}">
-                <a16:creationId xmlns:a16="http://schemas.microsoft.com/office/drawing/2014/main" id="{814DC081-5593-426E-B1F3-E1FF1E72FA6D}"/>
-              </a:ext>
-            </a:extLst>
-          </p:cNvPr>
-          <p:cNvSpPr txBox="1"/>
-          <p:nvPr/>
-        </p:nvSpPr>
-        <p:spPr>
-          <a:xfrm>
-            <a:off x="9930601" y="3503938"/>
-            <a:ext cx="1225015" cy="646331"/>
-          </a:xfrm>
-          <a:prstGeom prst="rect">
-            <a:avLst/>
-          </a:prstGeom>
-          <a:noFill/>
-        </p:spPr>
-        <p:txBody>
-          <a:bodyPr wrap="none" rtlCol="0">
-            <a:spAutoFit/>
-          </a:bodyPr>
-          <a:lstStyle/>
-          <a:p>
-            <a:r>
-              <a:rPr lang="fr-FR" sz="3600" dirty="0">
-                <a:latin typeface="+mj-lt"/>
-              </a:rPr>
-              <a:t>200 €</a:t>
-            </a:r>
-          </a:p>
-        </p:txBody>
-      </p:sp>
-      <p:sp>
-        <p:nvSpPr>
-          <p:cNvPr id="20" name="ZoneTexte 19">
-            <a:extLst>
-              <a:ext uri="{FF2B5EF4-FFF2-40B4-BE49-F238E27FC236}">
-                <a16:creationId xmlns:a16="http://schemas.microsoft.com/office/drawing/2014/main" id="{242E43C0-3F59-4EC0-9197-FED1A1702D88}"/>
-              </a:ext>
-            </a:extLst>
-          </p:cNvPr>
-          <p:cNvSpPr txBox="1"/>
-          <p:nvPr/>
-        </p:nvSpPr>
-        <p:spPr>
-          <a:xfrm>
-            <a:off x="8269286" y="4289048"/>
-            <a:ext cx="2947153" cy="646331"/>
-          </a:xfrm>
-          <a:prstGeom prst="rect">
-            <a:avLst/>
-          </a:prstGeom>
-          <a:noFill/>
-        </p:spPr>
-        <p:txBody>
-          <a:bodyPr wrap="none" rtlCol="0">
-            <a:spAutoFit/>
-          </a:bodyPr>
-          <a:lstStyle/>
-          <a:p>
-            <a:r>
-              <a:rPr lang="fr-FR" sz="3600" dirty="0">
-                <a:latin typeface="+mj-lt"/>
-              </a:rPr>
-              <a:t>Autre montant</a:t>
-            </a:r>
-          </a:p>
-        </p:txBody>
-      </p:sp>
-      <p:sp>
-        <p:nvSpPr>
-          <p:cNvPr id="23" name="Rectangle 22">
-            <a:extLst>
-              <a:ext uri="{FF2B5EF4-FFF2-40B4-BE49-F238E27FC236}">
-                <a16:creationId xmlns:a16="http://schemas.microsoft.com/office/drawing/2014/main" id="{D8CCB32B-0EC4-4882-9F93-04F634A68CE2}"/>
-              </a:ext>
-            </a:extLst>
-          </p:cNvPr>
-          <p:cNvSpPr/>
-          <p:nvPr/>
-        </p:nvSpPr>
-        <p:spPr>
-          <a:xfrm>
-            <a:off x="6200273" y="5386310"/>
-            <a:ext cx="5029200" cy="914400"/>
-          </a:xfrm>
-          <a:prstGeom prst="rect">
-            <a:avLst/>
-          </a:prstGeom>
-          <a:solidFill>
-            <a:srgbClr val="153E43">
-              <a:alpha val="62353"/>
-            </a:srgbClr>
-          </a:solidFill>
-          <a:ln>
-            <a:noFill/>
-          </a:ln>
-        </p:spPr>
-        <p:style>
-          <a:lnRef idx="2">
-            <a:schemeClr val="accent1">
-              <a:shade val="50000"/>
-            </a:schemeClr>
-          </a:lnRef>
-          <a:fillRef idx="1">
-            <a:schemeClr val="accent1"/>
-          </a:fillRef>
-          <a:effectRef idx="0">
-            <a:schemeClr val="accent1"/>
-          </a:effectRef>
-          <a:fontRef idx="minor">
-            <a:schemeClr val="lt1"/>
-          </a:fontRef>
-        </p:style>
-        <p:txBody>
-          <a:bodyPr rtlCol="0" anchor="ctr"/>
-          <a:lstStyle/>
-          <a:p>
-            <a:pPr algn="ctr"/>
-            <a:endParaRPr lang="fr-FR" dirty="0">
-              <a:latin typeface="Roboto Light" panose="02000000000000000000" pitchFamily="2" charset="0"/>
-              <a:ea typeface="Roboto Light" panose="02000000000000000000" pitchFamily="2" charset="0"/>
-            </a:endParaRPr>
-          </a:p>
-        </p:txBody>
-      </p:sp>
-      <p:sp>
-        <p:nvSpPr>
-          <p:cNvPr id="30" name="ZoneTexte 29">
-            <a:extLst>
-              <a:ext uri="{FF2B5EF4-FFF2-40B4-BE49-F238E27FC236}">
-                <a16:creationId xmlns:a16="http://schemas.microsoft.com/office/drawing/2014/main" id="{28D25877-F26A-4C02-B872-5FFFA9B2569D}"/>
-              </a:ext>
-            </a:extLst>
-          </p:cNvPr>
-          <p:cNvSpPr txBox="1"/>
-          <p:nvPr/>
-        </p:nvSpPr>
-        <p:spPr>
-          <a:xfrm>
-            <a:off x="9203637" y="5520344"/>
-            <a:ext cx="1925527" cy="646331"/>
-          </a:xfrm>
-          <a:prstGeom prst="rect">
-            <a:avLst/>
-          </a:prstGeom>
-          <a:noFill/>
-        </p:spPr>
-        <p:txBody>
-          <a:bodyPr wrap="none" rtlCol="0">
-            <a:spAutoFit/>
-          </a:bodyPr>
-          <a:lstStyle/>
-          <a:p>
-            <a:r>
-              <a:rPr lang="fr-FR" sz="3600" dirty="0">
-                <a:solidFill>
-                  <a:schemeClr val="bg1"/>
-                </a:solidFill>
-                <a:latin typeface="Roboto Light" panose="02000000000000000000" pitchFamily="2" charset="0"/>
-                <a:ea typeface="Roboto Light" panose="02000000000000000000" pitchFamily="2" charset="0"/>
-              </a:rPr>
-              <a:t>RETOUR</a:t>
+              <a:t>Retour au choix des opérations</a:t>
             </a:r>
           </a:p>
         </p:txBody>
@@ -15184,8 +15089,8 @@
         </p:nvSpPr>
         <p:spPr>
           <a:xfrm>
-            <a:off x="9203637" y="5520344"/>
-            <a:ext cx="1925527" cy="646331"/>
+            <a:off x="6324600" y="5581900"/>
+            <a:ext cx="5029200" cy="523220"/>
           </a:xfrm>
           <a:prstGeom prst="rect">
             <a:avLst/>
@@ -15193,20 +15098,20 @@
           <a:noFill/>
         </p:spPr>
         <p:txBody>
-          <a:bodyPr wrap="none" rtlCol="0">
+          <a:bodyPr wrap="square" rtlCol="0">
             <a:spAutoFit/>
           </a:bodyPr>
           <a:lstStyle/>
           <a:p>
             <a:r>
-              <a:rPr lang="fr-FR" sz="3600" dirty="0">
+              <a:rPr lang="fr-FR" sz="2800" dirty="0">
                 <a:solidFill>
                   <a:schemeClr val="bg1"/>
                 </a:solidFill>
                 <a:latin typeface="Roboto Light" panose="02000000000000000000" pitchFamily="2" charset="0"/>
                 <a:ea typeface="Roboto Light" panose="02000000000000000000" pitchFamily="2" charset="0"/>
               </a:rPr>
-              <a:t>RETOUR</a:t>
+              <a:t>Retour au choix des montants</a:t>
             </a:r>
           </a:p>
         </p:txBody>

</xml_diff>

<commit_message>
UP _ exo GAB rename écran code incorrect ressaisie
</commit_message>
<xml_diff>
--- a/FOAD_Unified_Process/GAB/maquettage_GAB_retirer de l'argent dont s'identifier.pptx
+++ b/FOAD_Unified_Process/GAB/maquettage_GAB_retirer de l'argent dont s'identifier.pptx
@@ -212,7 +212,7 @@
           <a:p>
             <a:fld id="{F96AEA39-73FA-47F0-852A-B7EF8546D397}" type="datetimeFigureOut">
               <a:rPr lang="fr-FR" smtClean="0"/>
-              <a:t>24/02/2021</a:t>
+              <a:t>25/02/2021</a:t>
             </a:fld>
             <a:endParaRPr lang="fr-FR"/>
           </a:p>
@@ -1214,7 +1214,7 @@
           <a:p>
             <a:fld id="{B0CDD8A6-34CA-4E2D-8EA8-2CC00E15D543}" type="datetimeFigureOut">
               <a:rPr lang="fr-FR" smtClean="0"/>
-              <a:t>24/02/2021</a:t>
+              <a:t>25/02/2021</a:t>
             </a:fld>
             <a:endParaRPr lang="fr-FR"/>
           </a:p>
@@ -1412,7 +1412,7 @@
           <a:p>
             <a:fld id="{B0CDD8A6-34CA-4E2D-8EA8-2CC00E15D543}" type="datetimeFigureOut">
               <a:rPr lang="fr-FR" smtClean="0"/>
-              <a:t>24/02/2021</a:t>
+              <a:t>25/02/2021</a:t>
             </a:fld>
             <a:endParaRPr lang="fr-FR"/>
           </a:p>
@@ -1620,7 +1620,7 @@
           <a:p>
             <a:fld id="{B0CDD8A6-34CA-4E2D-8EA8-2CC00E15D543}" type="datetimeFigureOut">
               <a:rPr lang="fr-FR" smtClean="0"/>
-              <a:t>24/02/2021</a:t>
+              <a:t>25/02/2021</a:t>
             </a:fld>
             <a:endParaRPr lang="fr-FR"/>
           </a:p>
@@ -1818,7 +1818,7 @@
           <a:p>
             <a:fld id="{B0CDD8A6-34CA-4E2D-8EA8-2CC00E15D543}" type="datetimeFigureOut">
               <a:rPr lang="fr-FR" smtClean="0"/>
-              <a:t>24/02/2021</a:t>
+              <a:t>25/02/2021</a:t>
             </a:fld>
             <a:endParaRPr lang="fr-FR"/>
           </a:p>
@@ -2093,7 +2093,7 @@
           <a:p>
             <a:fld id="{B0CDD8A6-34CA-4E2D-8EA8-2CC00E15D543}" type="datetimeFigureOut">
               <a:rPr lang="fr-FR" smtClean="0"/>
-              <a:t>24/02/2021</a:t>
+              <a:t>25/02/2021</a:t>
             </a:fld>
             <a:endParaRPr lang="fr-FR"/>
           </a:p>
@@ -2358,7 +2358,7 @@
           <a:p>
             <a:fld id="{B0CDD8A6-34CA-4E2D-8EA8-2CC00E15D543}" type="datetimeFigureOut">
               <a:rPr lang="fr-FR" smtClean="0"/>
-              <a:t>24/02/2021</a:t>
+              <a:t>25/02/2021</a:t>
             </a:fld>
             <a:endParaRPr lang="fr-FR"/>
           </a:p>
@@ -2770,7 +2770,7 @@
           <a:p>
             <a:fld id="{B0CDD8A6-34CA-4E2D-8EA8-2CC00E15D543}" type="datetimeFigureOut">
               <a:rPr lang="fr-FR" smtClean="0"/>
-              <a:t>24/02/2021</a:t>
+              <a:t>25/02/2021</a:t>
             </a:fld>
             <a:endParaRPr lang="fr-FR"/>
           </a:p>
@@ -2911,7 +2911,7 @@
           <a:p>
             <a:fld id="{B0CDD8A6-34CA-4E2D-8EA8-2CC00E15D543}" type="datetimeFigureOut">
               <a:rPr lang="fr-FR" smtClean="0"/>
-              <a:t>24/02/2021</a:t>
+              <a:t>25/02/2021</a:t>
             </a:fld>
             <a:endParaRPr lang="fr-FR"/>
           </a:p>
@@ -3024,7 +3024,7 @@
           <a:p>
             <a:fld id="{B0CDD8A6-34CA-4E2D-8EA8-2CC00E15D543}" type="datetimeFigureOut">
               <a:rPr lang="fr-FR" smtClean="0"/>
-              <a:t>24/02/2021</a:t>
+              <a:t>25/02/2021</a:t>
             </a:fld>
             <a:endParaRPr lang="fr-FR"/>
           </a:p>
@@ -3335,7 +3335,7 @@
           <a:p>
             <a:fld id="{B0CDD8A6-34CA-4E2D-8EA8-2CC00E15D543}" type="datetimeFigureOut">
               <a:rPr lang="fr-FR" smtClean="0"/>
-              <a:t>24/02/2021</a:t>
+              <a:t>25/02/2021</a:t>
             </a:fld>
             <a:endParaRPr lang="fr-FR"/>
           </a:p>
@@ -3623,7 +3623,7 @@
           <a:p>
             <a:fld id="{B0CDD8A6-34CA-4E2D-8EA8-2CC00E15D543}" type="datetimeFigureOut">
               <a:rPr lang="fr-FR" smtClean="0"/>
-              <a:t>24/02/2021</a:t>
+              <a:t>25/02/2021</a:t>
             </a:fld>
             <a:endParaRPr lang="fr-FR"/>
           </a:p>
@@ -3864,7 +3864,7 @@
           <a:p>
             <a:fld id="{B0CDD8A6-34CA-4E2D-8EA8-2CC00E15D543}" type="datetimeFigureOut">
               <a:rPr lang="fr-FR" smtClean="0"/>
-              <a:t>24/02/2021</a:t>
+              <a:t>25/02/2021</a:t>
             </a:fld>
             <a:endParaRPr lang="fr-FR"/>
           </a:p>
@@ -10621,7 +10621,7 @@
         <p:spPr>
           <a:xfrm>
             <a:off x="705853" y="63987"/>
-            <a:ext cx="3624710" cy="369332"/>
+            <a:ext cx="4676280" cy="369332"/>
           </a:xfrm>
           <a:prstGeom prst="rect">
             <a:avLst/>
@@ -10639,7 +10639,7 @@
                 <a:latin typeface="Roboto Light" panose="02000000000000000000" pitchFamily="2" charset="0"/>
                 <a:ea typeface="Roboto Light" panose="02000000000000000000" pitchFamily="2" charset="0"/>
               </a:rPr>
-              <a:t>Ecran : Code confidentiel incorrect</a:t>
+              <a:t>Ecran : Code confidentiel incorrect : ressaisie</a:t>
             </a:r>
           </a:p>
         </p:txBody>

</xml_diff>